<commit_message>
modificando template ppt e capa
</commit_message>
<xml_diff>
--- a/Template.pptx
+++ b/Template.pptx
@@ -259,7 +259,7 @@
           <a:p>
             <a:fld id="{81949A8C-AF72-4DBF-81AC-E31ECCB55584}" type="datetimeFigureOut">
               <a:rPr lang="pt-BR" smtClean="0"/>
-              <a:t>23/03/2021</a:t>
+              <a:t>03/05/2021</a:t>
             </a:fld>
             <a:endParaRPr lang="pt-BR"/>
           </a:p>
@@ -457,7 +457,7 @@
           <a:p>
             <a:fld id="{81949A8C-AF72-4DBF-81AC-E31ECCB55584}" type="datetimeFigureOut">
               <a:rPr lang="pt-BR" smtClean="0"/>
-              <a:t>23/03/2021</a:t>
+              <a:t>03/05/2021</a:t>
             </a:fld>
             <a:endParaRPr lang="pt-BR"/>
           </a:p>
@@ -665,7 +665,7 @@
           <a:p>
             <a:fld id="{81949A8C-AF72-4DBF-81AC-E31ECCB55584}" type="datetimeFigureOut">
               <a:rPr lang="pt-BR" smtClean="0"/>
-              <a:t>23/03/2021</a:t>
+              <a:t>03/05/2021</a:t>
             </a:fld>
             <a:endParaRPr lang="pt-BR"/>
           </a:p>
@@ -863,7 +863,7 @@
           <a:p>
             <a:fld id="{81949A8C-AF72-4DBF-81AC-E31ECCB55584}" type="datetimeFigureOut">
               <a:rPr lang="pt-BR" smtClean="0"/>
-              <a:t>23/03/2021</a:t>
+              <a:t>03/05/2021</a:t>
             </a:fld>
             <a:endParaRPr lang="pt-BR"/>
           </a:p>
@@ -1138,7 +1138,7 @@
           <a:p>
             <a:fld id="{81949A8C-AF72-4DBF-81AC-E31ECCB55584}" type="datetimeFigureOut">
               <a:rPr lang="pt-BR" smtClean="0"/>
-              <a:t>23/03/2021</a:t>
+              <a:t>03/05/2021</a:t>
             </a:fld>
             <a:endParaRPr lang="pt-BR"/>
           </a:p>
@@ -1403,7 +1403,7 @@
           <a:p>
             <a:fld id="{81949A8C-AF72-4DBF-81AC-E31ECCB55584}" type="datetimeFigureOut">
               <a:rPr lang="pt-BR" smtClean="0"/>
-              <a:t>23/03/2021</a:t>
+              <a:t>03/05/2021</a:t>
             </a:fld>
             <a:endParaRPr lang="pt-BR"/>
           </a:p>
@@ -1815,7 +1815,7 @@
           <a:p>
             <a:fld id="{81949A8C-AF72-4DBF-81AC-E31ECCB55584}" type="datetimeFigureOut">
               <a:rPr lang="pt-BR" smtClean="0"/>
-              <a:t>23/03/2021</a:t>
+              <a:t>03/05/2021</a:t>
             </a:fld>
             <a:endParaRPr lang="pt-BR"/>
           </a:p>
@@ -1956,7 +1956,7 @@
           <a:p>
             <a:fld id="{81949A8C-AF72-4DBF-81AC-E31ECCB55584}" type="datetimeFigureOut">
               <a:rPr lang="pt-BR" smtClean="0"/>
-              <a:t>23/03/2021</a:t>
+              <a:t>03/05/2021</a:t>
             </a:fld>
             <a:endParaRPr lang="pt-BR"/>
           </a:p>
@@ -2069,7 +2069,7 @@
           <a:p>
             <a:fld id="{81949A8C-AF72-4DBF-81AC-E31ECCB55584}" type="datetimeFigureOut">
               <a:rPr lang="pt-BR" smtClean="0"/>
-              <a:t>23/03/2021</a:t>
+              <a:t>03/05/2021</a:t>
             </a:fld>
             <a:endParaRPr lang="pt-BR"/>
           </a:p>
@@ -2380,7 +2380,7 @@
           <a:p>
             <a:fld id="{81949A8C-AF72-4DBF-81AC-E31ECCB55584}" type="datetimeFigureOut">
               <a:rPr lang="pt-BR" smtClean="0"/>
-              <a:t>23/03/2021</a:t>
+              <a:t>03/05/2021</a:t>
             </a:fld>
             <a:endParaRPr lang="pt-BR"/>
           </a:p>
@@ -2668,7 +2668,7 @@
           <a:p>
             <a:fld id="{81949A8C-AF72-4DBF-81AC-E31ECCB55584}" type="datetimeFigureOut">
               <a:rPr lang="pt-BR" smtClean="0"/>
-              <a:t>23/03/2021</a:t>
+              <a:t>03/05/2021</a:t>
             </a:fld>
             <a:endParaRPr lang="pt-BR"/>
           </a:p>
@@ -2909,7 +2909,7 @@
           <a:p>
             <a:fld id="{81949A8C-AF72-4DBF-81AC-E31ECCB55584}" type="datetimeFigureOut">
               <a:rPr lang="pt-BR" smtClean="0"/>
-              <a:t>23/03/2021</a:t>
+              <a:t>03/05/2021</a:t>
             </a:fld>
             <a:endParaRPr lang="pt-BR"/>
           </a:p>
@@ -3383,8 +3383,10 @@
           <a:p>
             <a:pPr algn="ctr"/>
             <a:r>
-              <a:rPr lang="pt-BR" dirty="0"/>
-              <a:t>CONTEMPLADOS</a:t>
+              <a:rPr lang="pt-BR" b="1" dirty="0">
+                <a:latin typeface="DIN" panose="02000503040000020003" pitchFamily="2" charset="0"/>
+              </a:rPr>
+              <a:t>GERAL</a:t>
             </a:r>
           </a:p>
         </p:txBody>
@@ -3437,7 +3439,12 @@
           <a:lstStyle/>
           <a:p>
             <a:pPr algn="ctr"/>
-            <a:endParaRPr lang="pt-BR"/>
+            <a:r>
+              <a:rPr lang="pt-BR" b="1" dirty="0">
+                <a:latin typeface="DIN" panose="02000503040000020003" pitchFamily="2" charset="0"/>
+              </a:rPr>
+              <a:t>BENEFICIÁRIOS</a:t>
+            </a:r>
           </a:p>
         </p:txBody>
       </p:sp>
@@ -3489,7 +3496,10 @@
           <a:lstStyle/>
           <a:p>
             <a:pPr algn="ctr"/>
-            <a:endParaRPr lang="pt-BR"/>
+            <a:r>
+              <a:rPr lang="pt-BR" b="1" dirty="0"/>
+              <a:t>ENTIDADES</a:t>
+            </a:r>
           </a:p>
         </p:txBody>
       </p:sp>
@@ -3541,7 +3551,10 @@
           <a:lstStyle/>
           <a:p>
             <a:pPr algn="ctr"/>
-            <a:endParaRPr lang="pt-BR"/>
+            <a:r>
+              <a:rPr lang="pt-BR" b="1" dirty="0"/>
+              <a:t>QUESTIONÁRIO</a:t>
+            </a:r>
           </a:p>
         </p:txBody>
       </p:sp>
@@ -3593,7 +3606,11 @@
           <a:lstStyle/>
           <a:p>
             <a:pPr algn="ctr"/>
-            <a:endParaRPr lang="pt-BR"/>
+            <a:r>
+              <a:rPr lang="pt-BR" b="1"/>
+              <a:t>DADOS - INSCRIÇÕES</a:t>
+            </a:r>
+            <a:endParaRPr lang="pt-BR" b="1" dirty="0"/>
           </a:p>
         </p:txBody>
       </p:sp>
@@ -3645,7 +3662,10 @@
           <a:lstStyle/>
           <a:p>
             <a:pPr algn="ctr"/>
-            <a:endParaRPr lang="pt-BR"/>
+            <a:r>
+              <a:rPr lang="pt-BR" dirty="0"/>
+              <a:t>DADOS - QUESTIONÁRIO</a:t>
+            </a:r>
           </a:p>
         </p:txBody>
       </p:sp>
@@ -3785,7 +3805,7 @@
                 <a:latin typeface="Rubik Mono One" panose="02000504020000020004" pitchFamily="2" charset="-79"/>
                 <a:cs typeface="Rubik Mono One" panose="02000504020000020004" pitchFamily="2" charset="-79"/>
               </a:rPr>
-              <a:t>título</a:t>
+              <a:t>Bolsa</a:t>
             </a:r>
           </a:p>
         </p:txBody>
@@ -3826,7 +3846,7 @@
                 <a:latin typeface="Rubik Mono One" panose="02000504020000020004" pitchFamily="2" charset="-79"/>
                 <a:cs typeface="Rubik Mono One" panose="02000504020000020004" pitchFamily="2" charset="-79"/>
               </a:rPr>
-              <a:t>título</a:t>
+              <a:t>Atleta</a:t>
             </a:r>
           </a:p>
         </p:txBody>

</xml_diff>